<commit_message>
prepare data and plot
</commit_message>
<xml_diff>
--- a/Chaston Dechor RC/summary.pptx
+++ b/Chaston Dechor RC/summary.pptx
@@ -152,6 +152,59 @@
 </p:presentation>
 </file>
 
+<file path=ppt/revisionInfo.xml><?xml version="1.0" encoding="utf-8"?>
+<p1510:revInfo xmlns:a="http://schemas.openxmlformats.org/drawingml/2006/main" xmlns:r="http://schemas.openxmlformats.org/officeDocument/2006/relationships" xmlns:p1510="http://schemas.microsoft.com/office/powerpoint/2015/10/main">
+  <p1510:revLst>
+    <p1510:client id="{52462AED-D97A-484B-ADF9-E5F78C839132}" v="3" dt="2020-07-13T15:40:59.592"/>
+  </p1510:revLst>
+</p1510:revInfo>
+</file>
+
+<file path=ppt/changesInfos/changesInfo1.xml><?xml version="1.0" encoding="utf-8"?>
+<pc:chgInfo xmlns:a="http://schemas.openxmlformats.org/drawingml/2006/main" xmlns:r="http://schemas.openxmlformats.org/officeDocument/2006/relationships" xmlns:ac="http://schemas.microsoft.com/office/drawing/2013/main/command" xmlns:pc="http://schemas.microsoft.com/office/powerpoint/2013/main/command">
+  <pc:docChgLst>
+    <pc:chgData clId="Web-{52462AED-D97A-484B-ADF9-E5F78C839132}"/>
+    <pc:docChg chg="modSld">
+      <pc:chgData name="" userId="" providerId="" clId="Web-{52462AED-D97A-484B-ADF9-E5F78C839132}" dt="2020-07-13T15:41:06.014" v="5"/>
+      <pc:docMkLst>
+        <pc:docMk/>
+      </pc:docMkLst>
+      <pc:sldChg chg="addSp delSp">
+        <pc:chgData name="" userId="" providerId="" clId="Web-{52462AED-D97A-484B-ADF9-E5F78C839132}" dt="2020-07-13T15:41:06.014" v="5"/>
+        <pc:sldMkLst>
+          <pc:docMk/>
+          <pc:sldMk cId="2405890931" sldId="266"/>
+        </pc:sldMkLst>
+        <pc:grpChg chg="add del">
+          <ac:chgData name="" userId="" providerId="" clId="Web-{52462AED-D97A-484B-ADF9-E5F78C839132}" dt="2020-07-13T15:41:06.014" v="5"/>
+          <ac:grpSpMkLst>
+            <pc:docMk/>
+            <pc:sldMk cId="2405890931" sldId="266"/>
+            <ac:grpSpMk id="19" creationId="{4DE9AFB5-144C-47FB-983D-CDFA723DAE89}"/>
+          </ac:grpSpMkLst>
+        </pc:grpChg>
+        <pc:grpChg chg="add del">
+          <ac:chgData name="" userId="" providerId="" clId="Web-{52462AED-D97A-484B-ADF9-E5F78C839132}" dt="2020-07-13T15:41:06.014" v="4"/>
+          <ac:grpSpMkLst>
+            <pc:docMk/>
+            <pc:sldMk cId="2405890931" sldId="266"/>
+            <ac:grpSpMk id="22" creationId="{252754ED-D578-43A4-9E4F-4D1DBB42F70A}"/>
+          </ac:grpSpMkLst>
+        </pc:grpChg>
+        <pc:grpChg chg="add del">
+          <ac:chgData name="" userId="" providerId="" clId="Web-{52462AED-D97A-484B-ADF9-E5F78C839132}" dt="2020-07-13T15:41:06.014" v="3"/>
+          <ac:grpSpMkLst>
+            <pc:docMk/>
+            <pc:sldMk cId="2405890931" sldId="266"/>
+            <ac:grpSpMk id="25" creationId="{7B02B847-801C-48D7-A797-01DA7D5C3828}"/>
+          </ac:grpSpMkLst>
+        </pc:grpChg>
+      </pc:sldChg>
+    </pc:docChg>
+  </pc:docChgLst>
+</pc:chgInfo>
+</file>
+
 <file path=ppt/notesMasters/notesMaster1.xml><?xml version="1.0" encoding="utf-8"?>
 <p:notesMaster xmlns:a="http://schemas.openxmlformats.org/drawingml/2006/main" xmlns:r="http://schemas.openxmlformats.org/officeDocument/2006/relationships" xmlns:p="http://schemas.openxmlformats.org/presentationml/2006/main">
   <p:cSld>
@@ -234,7 +287,7 @@
           <a:p>
             <a:fld id="{E4A4A6F3-4834-A14D-A16A-4E64CBB8D70B}" type="datetimeFigureOut">
               <a:rPr lang="en-US" smtClean="0"/>
-              <a:t>6/16/20</a:t>
+              <a:t>7/13/2020</a:t>
             </a:fld>
             <a:endParaRPr lang="en-US"/>
           </a:p>
@@ -900,7 +953,7 @@
           <a:p>
             <a:fld id="{B4A98340-F1B5-BB48-8419-6D845B93F772}" type="datetimeFigureOut">
               <a:rPr lang="en-US" smtClean="0"/>
-              <a:t>6/16/20</a:t>
+              <a:t>7/13/2020</a:t>
             </a:fld>
             <a:endParaRPr lang="en-US"/>
           </a:p>
@@ -1098,7 +1151,7 @@
           <a:p>
             <a:fld id="{B4A98340-F1B5-BB48-8419-6D845B93F772}" type="datetimeFigureOut">
               <a:rPr lang="en-US" smtClean="0"/>
-              <a:t>6/16/20</a:t>
+              <a:t>7/13/2020</a:t>
             </a:fld>
             <a:endParaRPr lang="en-US"/>
           </a:p>
@@ -1306,7 +1359,7 @@
           <a:p>
             <a:fld id="{B4A98340-F1B5-BB48-8419-6D845B93F772}" type="datetimeFigureOut">
               <a:rPr lang="en-US" smtClean="0"/>
-              <a:t>6/16/20</a:t>
+              <a:t>7/13/2020</a:t>
             </a:fld>
             <a:endParaRPr lang="en-US"/>
           </a:p>
@@ -1504,7 +1557,7 @@
           <a:p>
             <a:fld id="{B4A98340-F1B5-BB48-8419-6D845B93F772}" type="datetimeFigureOut">
               <a:rPr lang="en-US" smtClean="0"/>
-              <a:t>6/16/20</a:t>
+              <a:t>7/13/2020</a:t>
             </a:fld>
             <a:endParaRPr lang="en-US"/>
           </a:p>
@@ -1779,7 +1832,7 @@
           <a:p>
             <a:fld id="{B4A98340-F1B5-BB48-8419-6D845B93F772}" type="datetimeFigureOut">
               <a:rPr lang="en-US" smtClean="0"/>
-              <a:t>6/16/20</a:t>
+              <a:t>7/13/2020</a:t>
             </a:fld>
             <a:endParaRPr lang="en-US"/>
           </a:p>
@@ -2044,7 +2097,7 @@
           <a:p>
             <a:fld id="{B4A98340-F1B5-BB48-8419-6D845B93F772}" type="datetimeFigureOut">
               <a:rPr lang="en-US" smtClean="0"/>
-              <a:t>6/16/20</a:t>
+              <a:t>7/13/2020</a:t>
             </a:fld>
             <a:endParaRPr lang="en-US"/>
           </a:p>
@@ -2456,7 +2509,7 @@
           <a:p>
             <a:fld id="{B4A98340-F1B5-BB48-8419-6D845B93F772}" type="datetimeFigureOut">
               <a:rPr lang="en-US" smtClean="0"/>
-              <a:t>6/16/20</a:t>
+              <a:t>7/13/2020</a:t>
             </a:fld>
             <a:endParaRPr lang="en-US"/>
           </a:p>
@@ -2597,7 +2650,7 @@
           <a:p>
             <a:fld id="{B4A98340-F1B5-BB48-8419-6D845B93F772}" type="datetimeFigureOut">
               <a:rPr lang="en-US" smtClean="0"/>
-              <a:t>6/16/20</a:t>
+              <a:t>7/13/2020</a:t>
             </a:fld>
             <a:endParaRPr lang="en-US"/>
           </a:p>
@@ -2710,7 +2763,7 @@
           <a:p>
             <a:fld id="{B4A98340-F1B5-BB48-8419-6D845B93F772}" type="datetimeFigureOut">
               <a:rPr lang="en-US" smtClean="0"/>
-              <a:t>6/16/20</a:t>
+              <a:t>7/13/2020</a:t>
             </a:fld>
             <a:endParaRPr lang="en-US"/>
           </a:p>
@@ -3021,7 +3074,7 @@
           <a:p>
             <a:fld id="{B4A98340-F1B5-BB48-8419-6D845B93F772}" type="datetimeFigureOut">
               <a:rPr lang="en-US" smtClean="0"/>
-              <a:t>6/16/20</a:t>
+              <a:t>7/13/2020</a:t>
             </a:fld>
             <a:endParaRPr lang="en-US"/>
           </a:p>
@@ -3309,7 +3362,7 @@
           <a:p>
             <a:fld id="{B4A98340-F1B5-BB48-8419-6D845B93F772}" type="datetimeFigureOut">
               <a:rPr lang="en-US" smtClean="0"/>
-              <a:t>6/16/20</a:t>
+              <a:t>7/13/2020</a:t>
             </a:fld>
             <a:endParaRPr lang="en-US"/>
           </a:p>
@@ -3550,7 +3603,7 @@
           <a:p>
             <a:fld id="{B4A98340-F1B5-BB48-8419-6D845B93F772}" type="datetimeFigureOut">
               <a:rPr lang="en-US" smtClean="0"/>
-              <a:t>6/16/20</a:t>
+              <a:t>7/13/2020</a:t>
             </a:fld>
             <a:endParaRPr lang="en-US"/>
           </a:p>

</xml_diff>